<commit_message>
style: Changing website colors
</commit_message>
<xml_diff>
--- a/lawyer/guia_para_advogados.pptx
+++ b/lawyer/guia_para_advogados.pptx
@@ -55,6 +55,7 @@
     <p1510:client id="{9CEFBF67-3129-FAB0-DFB4-B4650528C9AD}" v="205" dt="2023-03-27T20:49:02.107"/>
     <p1510:client id="{CE4763CF-95B0-8EDC-4C64-8B802BF5122E}" v="45" dt="2023-03-24T20:19:29.690"/>
     <p1510:client id="{E3098E66-CB57-5EC8-94AA-F31148E2C06F}" v="473" dt="2023-03-23T12:39:09.261"/>
+    <p1510:client id="{FFD01718-2349-33F8-B8C5-14D2F9CBAD4B}" v="301" dt="2023-04-05T14:40:47.657"/>
   </p1510:revLst>
 </p1510:revInfo>
 </file>
@@ -250,7 +251,7 @@
           <a:p>
             <a:fld id="{1D8BD707-D9CF-40AE-B4C6-C98DA3205C09}" type="datetimeFigureOut">
               <a:rPr lang="en-US"/>
-              <a:t>3/27/2023</a:t>
+              <a:t>4/5/2023</a:t>
             </a:fld>
             <a:endParaRPr lang="en-US"/>
           </a:p>
@@ -415,7 +416,7 @@
           <a:p>
             <a:fld id="{1D8BD707-D9CF-40AE-B4C6-C98DA3205C09}" type="datetimeFigureOut">
               <a:rPr lang="en-US"/>
-              <a:t>3/27/2023</a:t>
+              <a:t>4/5/2023</a:t>
             </a:fld>
             <a:endParaRPr lang="en-US"/>
           </a:p>
@@ -623,7 +624,7 @@
           <a:p>
             <a:fld id="{1D8BD707-D9CF-40AE-B4C6-C98DA3205C09}" type="datetimeFigureOut">
               <a:rPr lang="en-US"/>
-              <a:t>3/27/2023</a:t>
+              <a:t>4/5/2023</a:t>
             </a:fld>
             <a:endParaRPr lang="en-US"/>
           </a:p>
@@ -765,7 +766,7 @@
           <a:p>
             <a:fld id="{1D8BD707-D9CF-40AE-B4C6-C98DA3205C09}" type="datetimeFigureOut">
               <a:rPr lang="en-US"/>
-              <a:t>3/27/2023</a:t>
+              <a:t>4/5/2023</a:t>
             </a:fld>
             <a:endParaRPr lang="en-US"/>
           </a:p>
@@ -884,7 +885,7 @@
           <a:p>
             <a:fld id="{1D8BD707-D9CF-40AE-B4C6-C98DA3205C09}" type="datetimeFigureOut">
               <a:rPr lang="en-US"/>
-              <a:t>3/27/2023</a:t>
+              <a:t>4/5/2023</a:t>
             </a:fld>
             <a:endParaRPr lang="en-US"/>
           </a:p>
@@ -1149,7 +1150,7 @@
           <a:p>
             <a:fld id="{1D8BD707-D9CF-40AE-B4C6-C98DA3205C09}" type="datetimeFigureOut">
               <a:rPr lang="en-US"/>
-              <a:t>3/27/2023</a:t>
+              <a:t>4/5/2023</a:t>
             </a:fld>
             <a:endParaRPr lang="en-US"/>
           </a:p>
@@ -3405,7 +3406,7 @@
                 <a:latin typeface="Calibri"/>
                 <a:cs typeface="Calibri"/>
               </a:rPr>
-              <a:t>Se você já tem um domínio registrado, por favor, nos informe qual é e iremos configurar sua landing </a:t>
+              <a:t>Se você já tem um domínio registrado, por favor, nos informe as credenciais de acesso, para que possamos configurar sua landing </a:t>
             </a:r>
             <a:r>
               <a:rPr lang="pt-BR" sz="1600" spc="204" dirty="0" err="1">
@@ -4681,7 +4682,7 @@
         <p:spPr>
           <a:xfrm>
             <a:off x="1359153" y="1412811"/>
-            <a:ext cx="4885690" cy="3787191"/>
+            <a:ext cx="4885690" cy="3502497"/>
           </a:xfrm>
           <a:prstGeom prst="rect">
             <a:avLst/>
@@ -4715,120 +4716,66 @@
               <a:t>:</a:t>
             </a:r>
             <a:r>
-              <a:rPr sz="1850" b="1" spc="250" dirty="0">
+              <a:rPr lang="pt-BR" sz="1850" b="1" spc="250" dirty="0">
                 <a:solidFill>
                   <a:srgbClr val="662E00"/>
                 </a:solidFill>
                 <a:latin typeface="Calibri"/>
                 <a:cs typeface="Calibri"/>
               </a:rPr>
-              <a:t> </a:t>
-            </a:r>
-            <a:r>
-              <a:rPr lang="en-US" sz="1850" spc="250" dirty="0">
+              <a:t> </a:t>
+            </a:r>
+            <a:r>
+              <a:rPr lang="pt-BR" sz="1850" spc="250" dirty="0">
                 <a:solidFill>
                   <a:srgbClr val="662E00"/>
                 </a:solidFill>
-              </a:rPr>
-              <a:t>ferramenta do Google e, </a:t>
-            </a:r>
-            <a:r>
-              <a:rPr lang="en-US" sz="1850" spc="250" dirty="0" err="1">
+                <a:latin typeface="Calibri"/>
+                <a:cs typeface="Calibri"/>
+              </a:rPr>
+              <a:t>Informe um </a:t>
+            </a:r>
+            <a:r>
+              <a:rPr lang="pt-BR" sz="1850" spc="250" dirty="0" err="1">
                 <a:solidFill>
                   <a:srgbClr val="662E00"/>
                 </a:solidFill>
-              </a:rPr>
-              <a:t>portanto</a:t>
-            </a:r>
-            <a:r>
-              <a:rPr lang="en-US" sz="1850" spc="250" dirty="0">
+                <a:latin typeface="Calibri"/>
+                <a:cs typeface="Calibri"/>
+              </a:rPr>
+              <a:t>gmail</a:t>
+            </a:r>
+            <a:r>
+              <a:rPr lang="pt-BR" sz="1850" spc="250" dirty="0">
                 <a:solidFill>
                   <a:srgbClr val="662E00"/>
                 </a:solidFill>
-              </a:rPr>
-              <a:t>, é </a:t>
-            </a:r>
-            <a:r>
-              <a:rPr lang="en-US" sz="1850" spc="250" dirty="0" err="1">
+                <a:latin typeface="Calibri"/>
+                <a:cs typeface="Calibri"/>
+              </a:rPr>
+              <a:t> para que possamos liberar acesso, por meio dele ao Google </a:t>
+            </a:r>
+            <a:r>
+              <a:rPr lang="pt-BR" sz="1850" spc="250" dirty="0" err="1">
                 <a:solidFill>
                   <a:srgbClr val="662E00"/>
                 </a:solidFill>
-              </a:rPr>
-              <a:t>necessário</a:t>
-            </a:r>
-            <a:r>
-              <a:rPr lang="en-US" sz="1850" spc="250" dirty="0">
+                <a:latin typeface="Calibri"/>
+                <a:cs typeface="Calibri"/>
+              </a:rPr>
+              <a:t>Analytics</a:t>
+            </a:r>
+            <a:r>
+              <a:rPr lang="pt-BR" sz="1850" spc="250" dirty="0">
                 <a:solidFill>
                   <a:srgbClr val="662E00"/>
                 </a:solidFill>
-              </a:rPr>
-              <a:t> que a </a:t>
-            </a:r>
-            <a:r>
-              <a:rPr lang="en-US" sz="1850" spc="250" dirty="0" err="1">
-                <a:solidFill>
-                  <a:srgbClr val="662E00"/>
-                </a:solidFill>
-              </a:rPr>
-              <a:t>conta</a:t>
-            </a:r>
-            <a:r>
-              <a:rPr lang="en-US" sz="1850" spc="250" dirty="0">
-                <a:solidFill>
-                  <a:srgbClr val="662E00"/>
-                </a:solidFill>
-              </a:rPr>
-              <a:t> </a:t>
-            </a:r>
-            <a:r>
-              <a:rPr lang="en-US" sz="1850" spc="250" dirty="0" err="1">
-                <a:solidFill>
-                  <a:srgbClr val="662E00"/>
-                </a:solidFill>
-              </a:rPr>
-              <a:t>utilizada</a:t>
-            </a:r>
-            <a:r>
-              <a:rPr lang="en-US" sz="1850" spc="250" dirty="0">
-                <a:solidFill>
-                  <a:srgbClr val="662E00"/>
-                </a:solidFill>
-              </a:rPr>
-              <a:t> </a:t>
-            </a:r>
-            <a:r>
-              <a:rPr lang="en-US" sz="1850" spc="250" dirty="0" err="1">
-                <a:solidFill>
-                  <a:srgbClr val="662E00"/>
-                </a:solidFill>
-              </a:rPr>
-              <a:t>esteja</a:t>
-            </a:r>
-            <a:r>
-              <a:rPr lang="en-US" sz="1850" spc="250" dirty="0">
-                <a:solidFill>
-                  <a:srgbClr val="662E00"/>
-                </a:solidFill>
-              </a:rPr>
-              <a:t> </a:t>
-            </a:r>
-            <a:r>
-              <a:rPr lang="en-US" sz="1850" spc="250" dirty="0" err="1">
-                <a:solidFill>
-                  <a:srgbClr val="662E00"/>
-                </a:solidFill>
-              </a:rPr>
-              <a:t>vinculada</a:t>
-            </a:r>
-            <a:r>
-              <a:rPr lang="en-US" sz="1850" spc="250" dirty="0">
-                <a:solidFill>
-                  <a:srgbClr val="662E00"/>
-                </a:solidFill>
-              </a:rPr>
-              <a:t> a um e-mail do Gmail.</a:t>
-            </a:r>
-            <a:endParaRPr lang="pt-BR" spc="250" dirty="0">
+                <a:latin typeface="Calibri"/>
+                <a:cs typeface="Calibri"/>
+              </a:rPr>
+              <a:t>.</a:t>
+            </a:r>
+            <a:endParaRPr lang="en-US" sz="1850" spc="250" dirty="0">
               <a:solidFill>
                 <a:srgbClr val="662E00"/>
               </a:solidFill>
@@ -5217,777 +5164,6 @@
           <a:chExt cx="0" cy="0"/>
         </a:xfrm>
       </p:grpSpPr>
-      <p:sp>
-        <p:nvSpPr>
-          <p:cNvPr id="2" name="object 2"/>
-          <p:cNvSpPr txBox="1"/>
-          <p:nvPr/>
-        </p:nvSpPr>
-        <p:spPr>
-          <a:xfrm>
-            <a:off x="6000230" y="1937724"/>
-            <a:ext cx="5242560" cy="2802627"/>
-          </a:xfrm>
-          <a:prstGeom prst="rect">
-            <a:avLst/>
-          </a:prstGeom>
-        </p:spPr>
-        <p:txBody>
-          <a:bodyPr vert="horz" wrap="square" lIns="0" tIns="36830" rIns="0" bIns="0" rtlCol="0" anchor="t">
-            <a:spAutoFit/>
-          </a:bodyPr>
-          <a:lstStyle/>
-          <a:p>
-            <a:pPr algn="l"/>
-            <a:r>
-              <a:rPr lang="en-US" sz="1600" spc="204" dirty="0">
-                <a:solidFill>
-                  <a:schemeClr val="accent2">
-                    <a:lumMod val="50000"/>
-                  </a:schemeClr>
-                </a:solidFill>
-              </a:rPr>
-              <a:t>É </a:t>
-            </a:r>
-            <a:r>
-              <a:rPr lang="en-US" sz="1600" spc="204" dirty="0" err="1">
-                <a:solidFill>
-                  <a:schemeClr val="accent2">
-                    <a:lumMod val="50000"/>
-                  </a:schemeClr>
-                </a:solidFill>
-              </a:rPr>
-              <a:t>importante</a:t>
-            </a:r>
-            <a:r>
-              <a:rPr lang="en-US" sz="1600" spc="204" dirty="0">
-                <a:solidFill>
-                  <a:schemeClr val="accent2">
-                    <a:lumMod val="50000"/>
-                  </a:schemeClr>
-                </a:solidFill>
-              </a:rPr>
-              <a:t> </a:t>
-            </a:r>
-            <a:r>
-              <a:rPr lang="en-US" sz="1600" spc="204" dirty="0" err="1">
-                <a:solidFill>
-                  <a:schemeClr val="accent2">
-                    <a:lumMod val="50000"/>
-                  </a:schemeClr>
-                </a:solidFill>
-              </a:rPr>
-              <a:t>destacar</a:t>
-            </a:r>
-            <a:r>
-              <a:rPr lang="en-US" sz="1600" spc="204" dirty="0">
-                <a:solidFill>
-                  <a:schemeClr val="accent2">
-                    <a:lumMod val="50000"/>
-                  </a:schemeClr>
-                </a:solidFill>
-              </a:rPr>
-              <a:t> que </a:t>
-            </a:r>
-            <a:r>
-              <a:rPr lang="en-US" sz="1600" spc="204" dirty="0" err="1">
-                <a:solidFill>
-                  <a:schemeClr val="accent2">
-                    <a:lumMod val="50000"/>
-                  </a:schemeClr>
-                </a:solidFill>
-              </a:rPr>
-              <a:t>uma</a:t>
-            </a:r>
-            <a:r>
-              <a:rPr lang="en-US" sz="1600" spc="204" dirty="0">
-                <a:solidFill>
-                  <a:schemeClr val="accent2">
-                    <a:lumMod val="50000"/>
-                  </a:schemeClr>
-                </a:solidFill>
-              </a:rPr>
-              <a:t> landing page </a:t>
-            </a:r>
-            <a:r>
-              <a:rPr lang="en-US" sz="1600" spc="204" dirty="0" err="1">
-                <a:solidFill>
-                  <a:schemeClr val="accent2">
-                    <a:lumMod val="50000"/>
-                  </a:schemeClr>
-                </a:solidFill>
-              </a:rPr>
-              <a:t>bem</a:t>
-            </a:r>
-            <a:r>
-              <a:rPr lang="en-US" sz="1600" spc="204" dirty="0">
-                <a:solidFill>
-                  <a:schemeClr val="accent2">
-                    <a:lumMod val="50000"/>
-                  </a:schemeClr>
-                </a:solidFill>
-              </a:rPr>
-              <a:t> </a:t>
-            </a:r>
-            <a:r>
-              <a:rPr lang="en-US" sz="1600" spc="204" dirty="0" err="1">
-                <a:solidFill>
-                  <a:schemeClr val="accent2">
-                    <a:lumMod val="50000"/>
-                  </a:schemeClr>
-                </a:solidFill>
-              </a:rPr>
-              <a:t>construída</a:t>
-            </a:r>
-            <a:r>
-              <a:rPr lang="en-US" sz="1600" spc="204" dirty="0">
-                <a:solidFill>
-                  <a:schemeClr val="accent2">
-                    <a:lumMod val="50000"/>
-                  </a:schemeClr>
-                </a:solidFill>
-              </a:rPr>
-              <a:t> </a:t>
-            </a:r>
-            <a:r>
-              <a:rPr lang="en-US" sz="1600" spc="204" dirty="0" err="1">
-                <a:solidFill>
-                  <a:schemeClr val="accent2">
-                    <a:lumMod val="50000"/>
-                  </a:schemeClr>
-                </a:solidFill>
-              </a:rPr>
-              <a:t>pode</a:t>
-            </a:r>
-            <a:r>
-              <a:rPr lang="en-US" sz="1600" spc="204" dirty="0">
-                <a:solidFill>
-                  <a:schemeClr val="accent2">
-                    <a:lumMod val="50000"/>
-                  </a:schemeClr>
-                </a:solidFill>
-              </a:rPr>
-              <a:t> </a:t>
-            </a:r>
-            <a:r>
-              <a:rPr lang="en-US" sz="1600" spc="204" dirty="0" err="1">
-                <a:solidFill>
-                  <a:schemeClr val="accent2">
-                    <a:lumMod val="50000"/>
-                  </a:schemeClr>
-                </a:solidFill>
-              </a:rPr>
-              <a:t>ajudar</a:t>
-            </a:r>
-            <a:r>
-              <a:rPr lang="en-US" sz="1600" spc="204" dirty="0">
-                <a:solidFill>
-                  <a:schemeClr val="accent2">
-                    <a:lumMod val="50000"/>
-                  </a:schemeClr>
-                </a:solidFill>
-              </a:rPr>
-              <a:t> um </a:t>
-            </a:r>
-            <a:r>
-              <a:rPr lang="en-US" sz="1600" spc="204" dirty="0" err="1">
-                <a:solidFill>
-                  <a:schemeClr val="accent2">
-                    <a:lumMod val="50000"/>
-                  </a:schemeClr>
-                </a:solidFill>
-              </a:rPr>
-              <a:t>advogado</a:t>
-            </a:r>
-            <a:r>
-              <a:rPr lang="en-US" sz="1600" spc="204" dirty="0">
-                <a:solidFill>
-                  <a:schemeClr val="accent2">
-                    <a:lumMod val="50000"/>
-                  </a:schemeClr>
-                </a:solidFill>
-              </a:rPr>
-              <a:t> a </a:t>
-            </a:r>
-            <a:r>
-              <a:rPr lang="en-US" sz="1600" spc="204" dirty="0" err="1">
-                <a:solidFill>
-                  <a:schemeClr val="accent2">
-                    <a:lumMod val="50000"/>
-                  </a:schemeClr>
-                </a:solidFill>
-              </a:rPr>
-              <a:t>alavancar</a:t>
-            </a:r>
-            <a:r>
-              <a:rPr lang="en-US" sz="1600" spc="204" dirty="0">
-                <a:solidFill>
-                  <a:schemeClr val="accent2">
-                    <a:lumMod val="50000"/>
-                  </a:schemeClr>
-                </a:solidFill>
-              </a:rPr>
-              <a:t> </a:t>
-            </a:r>
-            <a:r>
-              <a:rPr lang="en-US" sz="1600" spc="204" dirty="0" err="1">
-                <a:solidFill>
-                  <a:schemeClr val="accent2">
-                    <a:lumMod val="50000"/>
-                  </a:schemeClr>
-                </a:solidFill>
-              </a:rPr>
-              <a:t>sua</a:t>
-            </a:r>
-            <a:r>
-              <a:rPr lang="en-US" sz="1600" spc="204" dirty="0">
-                <a:solidFill>
-                  <a:schemeClr val="accent2">
-                    <a:lumMod val="50000"/>
-                  </a:schemeClr>
-                </a:solidFill>
-              </a:rPr>
-              <a:t> </a:t>
-            </a:r>
-            <a:r>
-              <a:rPr lang="en-US" sz="1600" spc="204" dirty="0" err="1">
-                <a:solidFill>
-                  <a:schemeClr val="accent2">
-                    <a:lumMod val="50000"/>
-                  </a:schemeClr>
-                </a:solidFill>
-              </a:rPr>
-              <a:t>carreira</a:t>
-            </a:r>
-            <a:r>
-              <a:rPr lang="en-US" sz="1600" spc="204" dirty="0">
-                <a:solidFill>
-                  <a:schemeClr val="accent2">
-                    <a:lumMod val="50000"/>
-                  </a:schemeClr>
-                </a:solidFill>
-              </a:rPr>
-              <a:t>, </a:t>
-            </a:r>
-            <a:r>
-              <a:rPr lang="en-US" sz="1600" spc="204" dirty="0" err="1">
-                <a:solidFill>
-                  <a:schemeClr val="accent2">
-                    <a:lumMod val="50000"/>
-                  </a:schemeClr>
-                </a:solidFill>
-              </a:rPr>
-              <a:t>atraindo</a:t>
-            </a:r>
-            <a:r>
-              <a:rPr lang="en-US" sz="1600" spc="204" dirty="0">
-                <a:solidFill>
-                  <a:schemeClr val="accent2">
-                    <a:lumMod val="50000"/>
-                  </a:schemeClr>
-                </a:solidFill>
-              </a:rPr>
-              <a:t> </a:t>
-            </a:r>
-            <a:r>
-              <a:rPr lang="en-US" sz="1600" spc="204" dirty="0" err="1">
-                <a:solidFill>
-                  <a:schemeClr val="accent2">
-                    <a:lumMod val="50000"/>
-                  </a:schemeClr>
-                </a:solidFill>
-              </a:rPr>
-              <a:t>novos</a:t>
-            </a:r>
-            <a:r>
-              <a:rPr lang="en-US" sz="1600" spc="204" dirty="0">
-                <a:solidFill>
-                  <a:schemeClr val="accent2">
-                    <a:lumMod val="50000"/>
-                  </a:schemeClr>
-                </a:solidFill>
-              </a:rPr>
-              <a:t> </a:t>
-            </a:r>
-            <a:r>
-              <a:rPr lang="en-US" sz="1600" spc="204" dirty="0" err="1">
-                <a:solidFill>
-                  <a:schemeClr val="accent2">
-                    <a:lumMod val="50000"/>
-                  </a:schemeClr>
-                </a:solidFill>
-              </a:rPr>
-              <a:t>clientes</a:t>
-            </a:r>
-            <a:r>
-              <a:rPr lang="en-US" sz="1600" spc="204" dirty="0">
-                <a:solidFill>
-                  <a:schemeClr val="accent2">
-                    <a:lumMod val="50000"/>
-                  </a:schemeClr>
-                </a:solidFill>
-              </a:rPr>
-              <a:t> e </a:t>
-            </a:r>
-            <a:r>
-              <a:rPr lang="en-US" sz="1600" spc="204" dirty="0" err="1">
-                <a:solidFill>
-                  <a:schemeClr val="accent2">
-                    <a:lumMod val="50000"/>
-                  </a:schemeClr>
-                </a:solidFill>
-              </a:rPr>
-              <a:t>ampliando</a:t>
-            </a:r>
-            <a:r>
-              <a:rPr lang="en-US" sz="1600" spc="204" dirty="0">
-                <a:solidFill>
-                  <a:schemeClr val="accent2">
-                    <a:lumMod val="50000"/>
-                  </a:schemeClr>
-                </a:solidFill>
-              </a:rPr>
-              <a:t> </a:t>
-            </a:r>
-            <a:r>
-              <a:rPr lang="en-US" sz="1600" spc="204" dirty="0" err="1">
-                <a:solidFill>
-                  <a:schemeClr val="accent2">
-                    <a:lumMod val="50000"/>
-                  </a:schemeClr>
-                </a:solidFill>
-              </a:rPr>
-              <a:t>sua</a:t>
-            </a:r>
-            <a:r>
-              <a:rPr lang="en-US" sz="1600" spc="204" dirty="0">
-                <a:solidFill>
-                  <a:schemeClr val="accent2">
-                    <a:lumMod val="50000"/>
-                  </a:schemeClr>
-                </a:solidFill>
-              </a:rPr>
-              <a:t> </a:t>
-            </a:r>
-            <a:r>
-              <a:rPr lang="en-US" sz="1600" spc="204" dirty="0" err="1">
-                <a:solidFill>
-                  <a:schemeClr val="accent2">
-                    <a:lumMod val="50000"/>
-                  </a:schemeClr>
-                </a:solidFill>
-              </a:rPr>
-              <a:t>visibilidade</a:t>
-            </a:r>
-            <a:r>
-              <a:rPr lang="en-US" sz="1600" spc="204" dirty="0">
-                <a:solidFill>
-                  <a:schemeClr val="accent2">
-                    <a:lumMod val="50000"/>
-                  </a:schemeClr>
-                </a:solidFill>
-              </a:rPr>
-              <a:t> </a:t>
-            </a:r>
-            <a:r>
-              <a:rPr lang="en-US" sz="1600" spc="204" dirty="0" err="1">
-                <a:solidFill>
-                  <a:schemeClr val="accent2">
-                    <a:lumMod val="50000"/>
-                  </a:schemeClr>
-                </a:solidFill>
-              </a:rPr>
-              <a:t>na</a:t>
-            </a:r>
-            <a:r>
-              <a:rPr lang="en-US" sz="1600" spc="204" dirty="0">
-                <a:solidFill>
-                  <a:schemeClr val="accent2">
-                    <a:lumMod val="50000"/>
-                  </a:schemeClr>
-                </a:solidFill>
-              </a:rPr>
-              <a:t> internet. </a:t>
-            </a:r>
-            <a:r>
-              <a:rPr lang="en-US" sz="1600" spc="204" dirty="0" err="1">
-                <a:solidFill>
-                  <a:schemeClr val="accent2">
-                    <a:lumMod val="50000"/>
-                  </a:schemeClr>
-                </a:solidFill>
-              </a:rPr>
-              <a:t>Além</a:t>
-            </a:r>
-            <a:r>
-              <a:rPr lang="en-US" sz="1600" spc="204" dirty="0">
-                <a:solidFill>
-                  <a:schemeClr val="accent2">
-                    <a:lumMod val="50000"/>
-                  </a:schemeClr>
-                </a:solidFill>
-              </a:rPr>
-              <a:t> </a:t>
-            </a:r>
-            <a:r>
-              <a:rPr lang="en-US" sz="1600" spc="204" dirty="0" err="1">
-                <a:solidFill>
-                  <a:schemeClr val="accent2">
-                    <a:lumMod val="50000"/>
-                  </a:schemeClr>
-                </a:solidFill>
-              </a:rPr>
-              <a:t>disso</a:t>
-            </a:r>
-            <a:r>
-              <a:rPr lang="en-US" sz="1600" spc="204" dirty="0">
-                <a:solidFill>
-                  <a:schemeClr val="accent2">
-                    <a:lumMod val="50000"/>
-                  </a:schemeClr>
-                </a:solidFill>
-              </a:rPr>
-              <a:t>, </a:t>
-            </a:r>
-            <a:r>
-              <a:rPr lang="en-US" sz="1600" spc="204" dirty="0" err="1">
-                <a:solidFill>
-                  <a:schemeClr val="accent2">
-                    <a:lumMod val="50000"/>
-                  </a:schemeClr>
-                </a:solidFill>
-              </a:rPr>
-              <a:t>uma</a:t>
-            </a:r>
-            <a:r>
-              <a:rPr lang="en-US" sz="1600" spc="204" dirty="0">
-                <a:solidFill>
-                  <a:schemeClr val="accent2">
-                    <a:lumMod val="50000"/>
-                  </a:schemeClr>
-                </a:solidFill>
-              </a:rPr>
-              <a:t> landing page </a:t>
-            </a:r>
-            <a:r>
-              <a:rPr lang="en-US" sz="1600" spc="204" dirty="0" err="1">
-                <a:solidFill>
-                  <a:schemeClr val="accent2">
-                    <a:lumMod val="50000"/>
-                  </a:schemeClr>
-                </a:solidFill>
-              </a:rPr>
-              <a:t>pode</a:t>
-            </a:r>
-            <a:r>
-              <a:rPr lang="en-US" sz="1600" spc="204" dirty="0">
-                <a:solidFill>
-                  <a:schemeClr val="accent2">
-                    <a:lumMod val="50000"/>
-                  </a:schemeClr>
-                </a:solidFill>
-              </a:rPr>
-              <a:t> ser </a:t>
-            </a:r>
-            <a:r>
-              <a:rPr lang="en-US" sz="1600" spc="204" dirty="0" err="1">
-                <a:solidFill>
-                  <a:schemeClr val="accent2">
-                    <a:lumMod val="50000"/>
-                  </a:schemeClr>
-                </a:solidFill>
-              </a:rPr>
-              <a:t>uma</a:t>
-            </a:r>
-            <a:r>
-              <a:rPr lang="en-US" sz="1600" spc="204" dirty="0">
-                <a:solidFill>
-                  <a:schemeClr val="accent2">
-                    <a:lumMod val="50000"/>
-                  </a:schemeClr>
-                </a:solidFill>
-              </a:rPr>
-              <a:t> forma </a:t>
-            </a:r>
-            <a:r>
-              <a:rPr lang="en-US" sz="1600" spc="204" dirty="0" err="1">
-                <a:solidFill>
-                  <a:schemeClr val="accent2">
-                    <a:lumMod val="50000"/>
-                  </a:schemeClr>
-                </a:solidFill>
-              </a:rPr>
-              <a:t>eficaz</a:t>
-            </a:r>
-            <a:r>
-              <a:rPr lang="en-US" sz="1600" spc="204" dirty="0">
-                <a:solidFill>
-                  <a:schemeClr val="accent2">
-                    <a:lumMod val="50000"/>
-                  </a:schemeClr>
-                </a:solidFill>
-              </a:rPr>
-              <a:t> de se </a:t>
-            </a:r>
-            <a:r>
-              <a:rPr lang="en-US" sz="1600" spc="204" dirty="0" err="1">
-                <a:solidFill>
-                  <a:schemeClr val="accent2">
-                    <a:lumMod val="50000"/>
-                  </a:schemeClr>
-                </a:solidFill>
-              </a:rPr>
-              <a:t>diferenciar</a:t>
-            </a:r>
-            <a:r>
-              <a:rPr lang="en-US" sz="1600" spc="204" dirty="0">
-                <a:solidFill>
-                  <a:schemeClr val="accent2">
-                    <a:lumMod val="50000"/>
-                  </a:schemeClr>
-                </a:solidFill>
-              </a:rPr>
-              <a:t> da </a:t>
-            </a:r>
-            <a:r>
-              <a:rPr lang="en-US" sz="1600" spc="204" dirty="0" err="1">
-                <a:solidFill>
-                  <a:schemeClr val="accent2">
-                    <a:lumMod val="50000"/>
-                  </a:schemeClr>
-                </a:solidFill>
-              </a:rPr>
-              <a:t>concorrência</a:t>
-            </a:r>
-            <a:r>
-              <a:rPr lang="en-US" sz="1600" spc="204" dirty="0">
-                <a:solidFill>
-                  <a:schemeClr val="accent2">
-                    <a:lumMod val="50000"/>
-                  </a:schemeClr>
-                </a:solidFill>
-              </a:rPr>
-              <a:t>, </a:t>
-            </a:r>
-            <a:r>
-              <a:rPr lang="en-US" sz="1600" spc="204" dirty="0" err="1">
-                <a:solidFill>
-                  <a:schemeClr val="accent2">
-                    <a:lumMod val="50000"/>
-                  </a:schemeClr>
-                </a:solidFill>
-              </a:rPr>
-              <a:t>mostrando</a:t>
-            </a:r>
-            <a:r>
-              <a:rPr lang="en-US" sz="1600" spc="204" dirty="0">
-                <a:solidFill>
-                  <a:schemeClr val="accent2">
-                    <a:lumMod val="50000"/>
-                  </a:schemeClr>
-                </a:solidFill>
-              </a:rPr>
-              <a:t> </a:t>
-            </a:r>
-            <a:r>
-              <a:rPr lang="en-US" sz="1600" spc="204" dirty="0" err="1">
-                <a:solidFill>
-                  <a:schemeClr val="accent2">
-                    <a:lumMod val="50000"/>
-                  </a:schemeClr>
-                </a:solidFill>
-              </a:rPr>
-              <a:t>ao</a:t>
-            </a:r>
-            <a:r>
-              <a:rPr lang="en-US" sz="1600" spc="204" dirty="0">
-                <a:solidFill>
-                  <a:schemeClr val="accent2">
-                    <a:lumMod val="50000"/>
-                  </a:schemeClr>
-                </a:solidFill>
-              </a:rPr>
-              <a:t> </a:t>
-            </a:r>
-            <a:r>
-              <a:rPr lang="en-US" sz="1600" spc="204" dirty="0" err="1">
-                <a:solidFill>
-                  <a:schemeClr val="accent2">
-                    <a:lumMod val="50000"/>
-                  </a:schemeClr>
-                </a:solidFill>
-              </a:rPr>
-              <a:t>cliente</a:t>
-            </a:r>
-            <a:r>
-              <a:rPr lang="en-US" sz="1600" spc="204" dirty="0">
-                <a:solidFill>
-                  <a:schemeClr val="accent2">
-                    <a:lumMod val="50000"/>
-                  </a:schemeClr>
-                </a:solidFill>
-              </a:rPr>
-              <a:t> </a:t>
-            </a:r>
-            <a:r>
-              <a:rPr lang="en-US" sz="1600" spc="204" dirty="0" err="1">
-                <a:solidFill>
-                  <a:schemeClr val="accent2">
-                    <a:lumMod val="50000"/>
-                  </a:schemeClr>
-                </a:solidFill>
-              </a:rPr>
-              <a:t>os</a:t>
-            </a:r>
-            <a:r>
-              <a:rPr lang="en-US" sz="1600" spc="204" dirty="0">
-                <a:solidFill>
-                  <a:schemeClr val="accent2">
-                    <a:lumMod val="50000"/>
-                  </a:schemeClr>
-                </a:solidFill>
-              </a:rPr>
-              <a:t> </a:t>
-            </a:r>
-            <a:r>
-              <a:rPr lang="en-US" sz="1600" spc="204" dirty="0" err="1">
-                <a:solidFill>
-                  <a:schemeClr val="accent2">
-                    <a:lumMod val="50000"/>
-                  </a:schemeClr>
-                </a:solidFill>
-              </a:rPr>
-              <a:t>diferenciais</a:t>
-            </a:r>
-            <a:r>
-              <a:rPr lang="en-US" sz="1600" spc="204" dirty="0">
-                <a:solidFill>
-                  <a:schemeClr val="accent2">
-                    <a:lumMod val="50000"/>
-                  </a:schemeClr>
-                </a:solidFill>
-              </a:rPr>
-              <a:t> do </a:t>
-            </a:r>
-            <a:r>
-              <a:rPr lang="en-US" sz="1600" spc="204" dirty="0" err="1">
-                <a:solidFill>
-                  <a:schemeClr val="accent2">
-                    <a:lumMod val="50000"/>
-                  </a:schemeClr>
-                </a:solidFill>
-              </a:rPr>
-              <a:t>escritório</a:t>
-            </a:r>
-            <a:r>
-              <a:rPr lang="en-US" sz="1600" spc="204" dirty="0">
-                <a:solidFill>
-                  <a:schemeClr val="accent2">
-                    <a:lumMod val="50000"/>
-                  </a:schemeClr>
-                </a:solidFill>
-              </a:rPr>
-              <a:t>, </a:t>
-            </a:r>
-            <a:r>
-              <a:rPr lang="en-US" sz="1600" spc="204" dirty="0" err="1">
-                <a:solidFill>
-                  <a:schemeClr val="accent2">
-                    <a:lumMod val="50000"/>
-                  </a:schemeClr>
-                </a:solidFill>
-              </a:rPr>
-              <a:t>como</a:t>
-            </a:r>
-            <a:r>
-              <a:rPr lang="en-US" sz="1600" spc="204" dirty="0">
-                <a:solidFill>
-                  <a:schemeClr val="accent2">
-                    <a:lumMod val="50000"/>
-                  </a:schemeClr>
-                </a:solidFill>
-              </a:rPr>
-              <a:t> a </a:t>
-            </a:r>
-            <a:r>
-              <a:rPr lang="en-US" sz="1600" spc="204" dirty="0" err="1">
-                <a:solidFill>
-                  <a:schemeClr val="accent2">
-                    <a:lumMod val="50000"/>
-                  </a:schemeClr>
-                </a:solidFill>
-              </a:rPr>
-              <a:t>experiência</a:t>
-            </a:r>
-            <a:r>
-              <a:rPr lang="en-US" sz="1600" spc="204" dirty="0">
-                <a:solidFill>
-                  <a:schemeClr val="accent2">
-                    <a:lumMod val="50000"/>
-                  </a:schemeClr>
-                </a:solidFill>
-              </a:rPr>
-              <a:t> e </a:t>
-            </a:r>
-            <a:r>
-              <a:rPr lang="en-US" sz="1600" spc="204" dirty="0" err="1">
-                <a:solidFill>
-                  <a:schemeClr val="accent2">
-                    <a:lumMod val="50000"/>
-                  </a:schemeClr>
-                </a:solidFill>
-              </a:rPr>
-              <a:t>competência</a:t>
-            </a:r>
-            <a:r>
-              <a:rPr lang="en-US" sz="1600" spc="204" dirty="0">
-                <a:solidFill>
-                  <a:schemeClr val="accent2">
-                    <a:lumMod val="50000"/>
-                  </a:schemeClr>
-                </a:solidFill>
-              </a:rPr>
-              <a:t>.</a:t>
-            </a:r>
-            <a:endParaRPr lang="en-US" dirty="0">
-              <a:solidFill>
-                <a:schemeClr val="accent2">
-                  <a:lumMod val="50000"/>
-                </a:schemeClr>
-              </a:solidFill>
-            </a:endParaRPr>
-          </a:p>
-          <a:p>
-            <a:pPr algn="l"/>
-            <a:endParaRPr lang="pt-BR" sz="1600" spc="204" dirty="0">
-              <a:solidFill>
-                <a:schemeClr val="accent2">
-                  <a:lumMod val="50000"/>
-                </a:schemeClr>
-              </a:solidFill>
-              <a:latin typeface="Calibri"/>
-              <a:cs typeface="Calibri"/>
-            </a:endParaRPr>
-          </a:p>
-          <a:p>
-            <a:pPr marL="12700" marR="5080">
-              <a:lnSpc>
-                <a:spcPct val="92600"/>
-              </a:lnSpc>
-              <a:spcBef>
-                <a:spcPts val="290"/>
-              </a:spcBef>
-            </a:pPr>
-            <a:endParaRPr lang="pt-BR" sz="1850" spc="204" dirty="0">
-              <a:solidFill>
-                <a:srgbClr val="44121A"/>
-              </a:solidFill>
-              <a:latin typeface="Calibri"/>
-              <a:cs typeface="Calibri"/>
-            </a:endParaRPr>
-          </a:p>
-        </p:txBody>
-      </p:sp>
       <p:grpSp>
         <p:nvGrpSpPr>
           <p:cNvPr id="3" name="object 3"/>
@@ -6069,6 +5245,81 @@
           </a:prstGeom>
         </p:spPr>
       </p:pic>
+      <p:sp>
+        <p:nvSpPr>
+          <p:cNvPr id="8" name="CaixaDeTexto 7">
+            <a:extLst>
+              <a:ext uri="{FF2B5EF4-FFF2-40B4-BE49-F238E27FC236}">
+                <a16:creationId xmlns:a16="http://schemas.microsoft.com/office/drawing/2014/main" id="{E3C50FC5-C88F-5B01-E6A7-C26470C49423}"/>
+              </a:ext>
+            </a:extLst>
+          </p:cNvPr>
+          <p:cNvSpPr txBox="1"/>
+          <p:nvPr/>
+        </p:nvSpPr>
+        <p:spPr>
+          <a:xfrm>
+            <a:off x="6452753" y="2296390"/>
+            <a:ext cx="4985038" cy="2308324"/>
+          </a:xfrm>
+          <a:prstGeom prst="rect">
+            <a:avLst/>
+          </a:prstGeom>
+          <a:noFill/>
+        </p:spPr>
+        <p:txBody>
+          <a:bodyPr rot="0" spcFirstLastPara="0" vertOverflow="overflow" horzOverflow="overflow" vert="horz" wrap="square" lIns="91440" tIns="45720" rIns="91440" bIns="45720" numCol="1" spcCol="0" rtlCol="0" fromWordArt="0" anchor="t" anchorCtr="0" forceAA="0" compatLnSpc="1">
+            <a:prstTxWarp prst="textNoShape">
+              <a:avLst/>
+            </a:prstTxWarp>
+            <a:spAutoFit/>
+          </a:bodyPr>
+          <a:lstStyle/>
+          <a:p>
+            <a:pPr algn="l"/>
+            <a:r>
+              <a:rPr lang="pt-BR" dirty="0">
+                <a:solidFill>
+                  <a:srgbClr val="662E00"/>
+                </a:solidFill>
+              </a:rPr>
+              <a:t>É importante destacar que uma landing </a:t>
+            </a:r>
+            <a:r>
+              <a:rPr lang="pt-BR" dirty="0" err="1">
+                <a:solidFill>
+                  <a:srgbClr val="662E00"/>
+                </a:solidFill>
+              </a:rPr>
+              <a:t>page</a:t>
+            </a:r>
+            <a:r>
+              <a:rPr lang="pt-BR" dirty="0">
+                <a:solidFill>
+                  <a:srgbClr val="662E00"/>
+                </a:solidFill>
+              </a:rPr>
+              <a:t> bem construída pode ajudar um advogado a alavancar sua carreira, atraindo novos clientes e ampliando sua visibilidade na internet. Além disso, uma landing </a:t>
+            </a:r>
+            <a:r>
+              <a:rPr lang="pt-BR" dirty="0" err="1">
+                <a:solidFill>
+                  <a:srgbClr val="662E00"/>
+                </a:solidFill>
+              </a:rPr>
+              <a:t>page</a:t>
+            </a:r>
+            <a:r>
+              <a:rPr lang="pt-BR" dirty="0">
+                <a:solidFill>
+                  <a:srgbClr val="662E00"/>
+                </a:solidFill>
+              </a:rPr>
+              <a:t> pode ser uma forma eficaz de se diferenciar da concorrência, mostrando ao cliente os diferenciais do escritório, como a experiência e competência. </a:t>
+            </a:r>
+          </a:p>
+        </p:txBody>
+      </p:sp>
     </p:spTree>
     <p:extLst>
       <p:ext uri="{BB962C8B-B14F-4D97-AF65-F5344CB8AC3E}">
@@ -12910,7 +12161,7 @@
         <p:spPr>
           <a:xfrm>
             <a:off x="1350391" y="2496819"/>
-            <a:ext cx="4794250" cy="2343785"/>
+            <a:ext cx="4794250" cy="2639697"/>
           </a:xfrm>
           <a:prstGeom prst="rect">
             <a:avLst/>
@@ -12931,54 +12182,6 @@
               </a:spcBef>
             </a:pPr>
             <a:r>
-              <a:rPr sz="1850" b="1" spc="125" dirty="0">
-                <a:solidFill>
-                  <a:schemeClr val="accent2">
-                    <a:lumMod val="50000"/>
-                  </a:schemeClr>
-                </a:solidFill>
-                <a:latin typeface="Calibri"/>
-                <a:cs typeface="Calibri"/>
-              </a:rPr>
-              <a:t>Escritório</a:t>
-            </a:r>
-            <a:r>
-              <a:rPr sz="1850" b="1" spc="215" dirty="0">
-                <a:solidFill>
-                  <a:schemeClr val="accent2">
-                    <a:lumMod val="50000"/>
-                  </a:schemeClr>
-                </a:solidFill>
-                <a:latin typeface="Calibri"/>
-                <a:cs typeface="Calibri"/>
-              </a:rPr>
-              <a:t> </a:t>
-            </a:r>
-            <a:r>
-              <a:rPr sz="1850" b="1" spc="185" dirty="0">
-                <a:solidFill>
-                  <a:schemeClr val="accent2">
-                    <a:lumMod val="50000"/>
-                  </a:schemeClr>
-                </a:solidFill>
-                <a:latin typeface="Calibri"/>
-                <a:cs typeface="Calibri"/>
-              </a:rPr>
-              <a:t>e</a:t>
-            </a:r>
-            <a:r>
-              <a:rPr sz="1850" b="1" spc="50" dirty="0">
-                <a:solidFill>
-                  <a:schemeClr val="accent2">
-                    <a:lumMod val="50000"/>
-                  </a:schemeClr>
-                </a:solidFill>
-                <a:latin typeface="Calibri"/>
-                <a:cs typeface="Calibri"/>
-              </a:rPr>
-              <a:t> </a:t>
-            </a:r>
-            <a:r>
               <a:rPr sz="1850" b="1" spc="155" dirty="0">
                 <a:solidFill>
                   <a:schemeClr val="accent2">
@@ -12988,7 +12191,31 @@
                 <a:latin typeface="Calibri"/>
                 <a:cs typeface="Calibri"/>
               </a:rPr>
-              <a:t>Equipe:</a:t>
+              <a:t>Equipe</a:t>
+            </a:r>
+            <a:r>
+              <a:rPr lang="pt-BR" sz="1850" b="1" spc="155" dirty="0">
+                <a:solidFill>
+                  <a:schemeClr val="accent2">
+                    <a:lumMod val="50000"/>
+                  </a:schemeClr>
+                </a:solidFill>
+                <a:latin typeface="Calibri"/>
+                <a:cs typeface="Calibri"/>
+              </a:rPr>
+              <a:t> e especialidades</a:t>
+            </a:r>
+            <a:r>
+              <a:rPr sz="1850" b="1" spc="155" dirty="0">
+                <a:solidFill>
+                  <a:schemeClr val="accent2">
+                    <a:lumMod val="50000"/>
+                  </a:schemeClr>
+                </a:solidFill>
+                <a:latin typeface="Calibri"/>
+                <a:cs typeface="Calibri"/>
+              </a:rPr>
+              <a:t>:</a:t>
             </a:r>
             <a:r>
               <a:rPr sz="1850" b="1" spc="335" dirty="0">
@@ -14127,7 +13354,7 @@
         <p:spPr>
           <a:xfrm>
             <a:off x="5861684" y="2780961"/>
-            <a:ext cx="5386705" cy="2047239"/>
+            <a:ext cx="5386705" cy="2372188"/>
           </a:xfrm>
           <a:prstGeom prst="rect">
             <a:avLst/>
@@ -14148,7 +13375,7 @@
               </a:spcBef>
             </a:pPr>
             <a:r>
-              <a:rPr sz="2000" b="1" spc="155" dirty="0">
+              <a:rPr sz="2000" b="1" spc="155" dirty="0" err="1">
                 <a:solidFill>
                   <a:schemeClr val="accent2">
                     <a:lumMod val="50000"/>
@@ -14196,7 +13423,7 @@
               <a:t> </a:t>
             </a:r>
             <a:r>
-              <a:rPr sz="2000" b="1" spc="145" dirty="0">
+              <a:rPr sz="2000" b="1" spc="145" dirty="0" err="1">
                 <a:solidFill>
                   <a:schemeClr val="accent2">
                     <a:lumMod val="50000"/>
@@ -14244,6 +13471,30 @@
               <a:t> </a:t>
             </a:r>
             <a:r>
+              <a:rPr sz="2000" b="1" spc="140" dirty="0" err="1">
+                <a:solidFill>
+                  <a:schemeClr val="accent2">
+                    <a:lumMod val="50000"/>
+                  </a:schemeClr>
+                </a:solidFill>
+                <a:latin typeface="Calibri"/>
+                <a:cs typeface="Calibri"/>
+              </a:rPr>
+              <a:t>Escritório</a:t>
+            </a:r>
+            <a:r>
+              <a:rPr lang="pt-BR" sz="2000" b="1" spc="140" dirty="0">
+                <a:solidFill>
+                  <a:schemeClr val="accent2">
+                    <a:lumMod val="50000"/>
+                  </a:schemeClr>
+                </a:solidFill>
+                <a:latin typeface="Calibri"/>
+                <a:cs typeface="Calibri"/>
+              </a:rPr>
+              <a:t> (opcional)</a:t>
+            </a:r>
+            <a:r>
               <a:rPr sz="2000" b="1" spc="140" dirty="0">
                 <a:solidFill>
                   <a:schemeClr val="accent2">
@@ -14253,7 +13504,7 @@
                 <a:latin typeface="Calibri"/>
                 <a:cs typeface="Calibri"/>
               </a:rPr>
-              <a:t>Escritório:</a:t>
+              <a:t>:</a:t>
             </a:r>
             <a:r>
               <a:rPr sz="2000" b="1" spc="-135" dirty="0">
@@ -14268,6 +13519,18 @@
               <a:t> </a:t>
             </a:r>
             <a:r>
+              <a:rPr sz="2000" spc="120" dirty="0" err="1">
+                <a:solidFill>
+                  <a:schemeClr val="accent2">
+                    <a:lumMod val="50000"/>
+                  </a:schemeClr>
+                </a:solidFill>
+                <a:latin typeface="Calibri"/>
+                <a:cs typeface="Calibri"/>
+              </a:rPr>
+              <a:t>Descreva</a:t>
+            </a:r>
+            <a:r>
               <a:rPr sz="2000" spc="120" dirty="0">
                 <a:solidFill>
                   <a:schemeClr val="accent2">
@@ -14277,7 +13540,7 @@
                 <a:latin typeface="Calibri"/>
                 <a:cs typeface="Calibri"/>
               </a:rPr>
-              <a:t>Descreva </a:t>
+              <a:t> </a:t>
             </a:r>
             <a:r>
               <a:rPr sz="2000" spc="175" dirty="0">
@@ -14304,7 +13567,7 @@
               <a:t> </a:t>
             </a:r>
             <a:r>
-              <a:rPr sz="2000" spc="120" dirty="0">
+              <a:rPr sz="2000" spc="120" dirty="0" err="1">
                 <a:solidFill>
                   <a:schemeClr val="accent2">
                     <a:lumMod val="50000"/>

</xml_diff>